<commit_message>
L2 - Corrected "Conditional Jump" to just "Jump" for Format III instructions L2 - Added Datasheets to reading list (all covered in class and lesson notes)
</commit_message>
<xml_diff>
--- a/notes/L2/Lsn2.pptx
+++ b/notes/L2/Lsn2.pptx
@@ -2035,7 +2035,7 @@
               <a:pPr>
                 <a:defRPr/>
               </a:pPr>
-              <a:t>13 August 2017</a:t>
+              <a:t>15 August 2017</a:t>
             </a:fld>
             <a:endParaRPr lang="en-US">
               <a:solidFill>
@@ -2268,7 +2268,7 @@
               <a:pPr>
                 <a:defRPr/>
               </a:pPr>
-              <a:t>13 August 2017</a:t>
+              <a:t>15 August 2017</a:t>
             </a:fld>
             <a:endParaRPr lang="en-US">
               <a:solidFill>
@@ -2597,7 +2597,7 @@
               <a:pPr>
                 <a:defRPr/>
               </a:pPr>
-              <a:t>13 August 2017</a:t>
+              <a:t>15 August 2017</a:t>
             </a:fld>
             <a:endParaRPr lang="en-US">
               <a:solidFill>
@@ -3065,7 +3065,7 @@
               <a:pPr>
                 <a:defRPr/>
               </a:pPr>
-              <a:t>13 August 2017</a:t>
+              <a:t>15 August 2017</a:t>
             </a:fld>
             <a:endParaRPr lang="en-US">
               <a:solidFill>
@@ -3224,7 +3224,7 @@
               <a:pPr>
                 <a:defRPr/>
               </a:pPr>
-              <a:t>13 August 2017</a:t>
+              <a:t>15 August 2017</a:t>
             </a:fld>
             <a:endParaRPr lang="en-US">
               <a:solidFill>
@@ -3467,7 +3467,7 @@
               <a:pPr>
                 <a:defRPr/>
               </a:pPr>
-              <a:t>13 August 2017</a:t>
+              <a:t>15 August 2017</a:t>
             </a:fld>
             <a:endParaRPr lang="en-US">
               <a:solidFill>
@@ -3785,7 +3785,7 @@
               <a:pPr>
                 <a:defRPr/>
               </a:pPr>
-              <a:t>13 August 2017</a:t>
+              <a:t>15 August 2017</a:t>
             </a:fld>
             <a:endParaRPr lang="en-US">
               <a:solidFill>
@@ -4080,7 +4080,7 @@
               <a:pPr>
                 <a:defRPr/>
               </a:pPr>
-              <a:t>13 August 2017</a:t>
+              <a:t>15 August 2017</a:t>
             </a:fld>
             <a:endParaRPr lang="en-US">
               <a:solidFill>
@@ -4291,7 +4291,7 @@
               <a:pPr>
                 <a:defRPr/>
               </a:pPr>
-              <a:t>13 August 2017</a:t>
+              <a:t>15 August 2017</a:t>
             </a:fld>
             <a:endParaRPr lang="en-US">
               <a:solidFill>
@@ -4512,7 +4512,7 @@
               <a:pPr>
                 <a:defRPr/>
               </a:pPr>
-              <a:t>13 August 2017</a:t>
+              <a:t>15 August 2017</a:t>
             </a:fld>
             <a:endParaRPr lang="en-US">
               <a:solidFill>
@@ -4701,7 +4701,7 @@
               <a:pPr>
                 <a:defRPr/>
               </a:pPr>
-              <a:t>13 August 2017</a:t>
+              <a:t>15 August 2017</a:t>
             </a:fld>
             <a:endParaRPr lang="en-US">
               <a:solidFill>
@@ -7373,7 +7373,7 @@
                 </a:spcBef>
                 <a:defRPr/>
               </a:pPr>
-              <a:t>13 August 2017</a:t>
+              <a:t>15 August 2017</a:t>
             </a:fld>
             <a:endParaRPr lang="en-US" sz="1400">
               <a:solidFill>
@@ -15715,7 +15715,7 @@
               <a:pPr>
                 <a:defRPr/>
               </a:pPr>
-              <a:t>13 August 2017</a:t>
+              <a:t>15 August 2017</a:t>
             </a:fld>
             <a:endParaRPr lang="en-US" sz="1400" dirty="0">
               <a:solidFill>
@@ -19849,7 +19849,36 @@
             </a:r>
           </a:p>
           <a:p>
-            <a:pPr lvl="2"/>
+            <a:pPr marL="1371600" lvl="2" indent="-457200">
+              <a:buFont typeface="+mj-lt"/>
+              <a:buAutoNum type="arabicPeriod"/>
+            </a:pPr>
+            <a:r>
+              <a:rPr lang="en-US" dirty="0" smtClean="0">
+                <a:solidFill>
+                  <a:srgbClr val="0070C0"/>
+                </a:solidFill>
+              </a:rPr>
+              <a:t>Two-operand </a:t>
+            </a:r>
+            <a:endParaRPr lang="en-US" dirty="0">
+              <a:solidFill>
+                <a:srgbClr val="0070C0"/>
+              </a:solidFill>
+            </a:endParaRPr>
+          </a:p>
+          <a:p>
+            <a:pPr lvl="3"/>
+            <a:r>
+              <a:rPr lang="en-US" dirty="0"/>
+              <a:t>for instance, MOV r12, r10</a:t>
+            </a:r>
+          </a:p>
+          <a:p>
+            <a:pPr marL="1371600" lvl="2" indent="-457200">
+              <a:buFont typeface="+mj-lt"/>
+              <a:buAutoNum type="arabicPeriod"/>
+            </a:pPr>
             <a:r>
               <a:rPr lang="en-US" dirty="0">
                 <a:solidFill>
@@ -19867,14 +19896,17 @@
             </a:r>
           </a:p>
           <a:p>
-            <a:pPr lvl="2"/>
+            <a:pPr marL="1371600" lvl="2" indent="-457200">
+              <a:buFont typeface="+mj-lt"/>
+              <a:buAutoNum type="arabicPeriod"/>
+            </a:pPr>
             <a:r>
               <a:rPr lang="en-US" dirty="0">
                 <a:solidFill>
                   <a:srgbClr val="0070C0"/>
                 </a:solidFill>
               </a:rPr>
-              <a:t>Conditional jump</a:t>
+              <a:t>Jump</a:t>
             </a:r>
           </a:p>
           <a:p>
@@ -19888,24 +19920,6 @@
               <a:t>jump_label</a:t>
             </a:r>
             <a:endParaRPr lang="en-US" dirty="0"/>
-          </a:p>
-          <a:p>
-            <a:pPr lvl="2"/>
-            <a:r>
-              <a:rPr lang="en-US" dirty="0">
-                <a:solidFill>
-                  <a:srgbClr val="0070C0"/>
-                </a:solidFill>
-              </a:rPr>
-              <a:t>Two-operand </a:t>
-            </a:r>
-          </a:p>
-          <a:p>
-            <a:pPr lvl="3"/>
-            <a:r>
-              <a:rPr lang="en-US" dirty="0"/>
-              <a:t>for instance, MOV r12, r10</a:t>
-            </a:r>
           </a:p>
           <a:p>
             <a:endParaRPr lang="en-US" dirty="0"/>

</xml_diff>